<commit_message>
final mod on .ipynb
</commit_message>
<xml_diff>
--- a/project/Hotel Booking.pptx
+++ b/project/Hotel Booking.pptx
@@ -110,6 +110,11 @@
       </a:defRPr>
     </a:lvl9pPr>
   </p:defaultTextStyle>
+  <p:extLst>
+    <p:ext uri="{EFAFB233-063F-42B5-8137-9DF3F51BA10A}">
+      <p15:sldGuideLst xmlns:p15="http://schemas.microsoft.com/office/powerpoint/2012/main"/>
+    </p:ext>
+  </p:extLst>
 </p:presentation>
 </file>
 
@@ -195,7 +200,7 @@
           <a:p>
             <a:fld id="{B6F43A0E-1879-F84A-B9D9-5C292F259D8B}" type="datetimeFigureOut">
               <a:rPr lang="en-US" smtClean="0"/>
-              <a:t>3/21/20</a:t>
+              <a:t>3/22/20</a:t>
             </a:fld>
             <a:endParaRPr lang="en-US"/>
           </a:p>
@@ -601,7 +606,7 @@
           <a:p>
             <a:fld id="{65CBDC6F-F3B1-8749-95C6-C9FC76966903}" type="datetime1">
               <a:rPr lang="en-CA" smtClean="0"/>
-              <a:t>2020-03-21</a:t>
+              <a:t>2020-03-22</a:t>
             </a:fld>
             <a:endParaRPr lang="en-US" dirty="0"/>
           </a:p>
@@ -807,7 +812,7 @@
           <a:p>
             <a:fld id="{ED570FD5-B3D1-C94B-B716-8019E0E49A91}" type="datetime1">
               <a:rPr lang="en-CA" smtClean="0"/>
-              <a:t>2020-03-21</a:t>
+              <a:t>2020-03-22</a:t>
             </a:fld>
             <a:endParaRPr lang="en-US" dirty="0"/>
           </a:p>
@@ -1017,7 +1022,7 @@
           <a:p>
             <a:fld id="{7E333828-BBCB-7744-BF4C-E1F8964C63F6}" type="datetime1">
               <a:rPr lang="en-CA" smtClean="0"/>
-              <a:t>2020-03-21</a:t>
+              <a:t>2020-03-22</a:t>
             </a:fld>
             <a:endParaRPr lang="en-US" dirty="0"/>
           </a:p>
@@ -1213,7 +1218,7 @@
           <a:p>
             <a:fld id="{3D383427-C225-F748-B38D-EC057FB6D5C8}" type="datetime1">
               <a:rPr lang="en-CA" smtClean="0"/>
-              <a:t>2020-03-21</a:t>
+              <a:t>2020-03-22</a:t>
             </a:fld>
             <a:endParaRPr lang="en-US" dirty="0"/>
           </a:p>
@@ -1487,7 +1492,7 @@
           <a:p>
             <a:fld id="{77F2AC2F-D340-144F-900E-826AB2CD997C}" type="datetime1">
               <a:rPr lang="en-CA" smtClean="0"/>
-              <a:t>2020-03-21</a:t>
+              <a:t>2020-03-22</a:t>
             </a:fld>
             <a:endParaRPr lang="en-US" dirty="0"/>
           </a:p>
@@ -1750,7 +1755,7 @@
           <a:p>
             <a:fld id="{A64C84BB-F770-4145-801F-5AED69D434D2}" type="datetime1">
               <a:rPr lang="en-CA" smtClean="0"/>
-              <a:t>2020-03-21</a:t>
+              <a:t>2020-03-22</a:t>
             </a:fld>
             <a:endParaRPr lang="en-US" dirty="0"/>
           </a:p>
@@ -2161,7 +2166,7 @@
           <a:p>
             <a:fld id="{57309A77-0A1D-6147-AEFA-6661A15E6008}" type="datetime1">
               <a:rPr lang="en-CA" smtClean="0"/>
-              <a:t>2020-03-21</a:t>
+              <a:t>2020-03-22</a:t>
             </a:fld>
             <a:endParaRPr lang="en-US" dirty="0"/>
           </a:p>
@@ -2305,7 +2310,7 @@
           <a:p>
             <a:fld id="{6D12B18E-0441-C842-9042-A451055D260F}" type="datetime1">
               <a:rPr lang="en-CA" smtClean="0"/>
-              <a:t>2020-03-21</a:t>
+              <a:t>2020-03-22</a:t>
             </a:fld>
             <a:endParaRPr lang="en-US" dirty="0"/>
           </a:p>
@@ -2426,7 +2431,7 @@
           <a:p>
             <a:fld id="{6C772CF7-14AD-8B4E-84ED-1F40F6D9B143}" type="datetime1">
               <a:rPr lang="en-CA" smtClean="0"/>
-              <a:t>2020-03-21</a:t>
+              <a:t>2020-03-22</a:t>
             </a:fld>
             <a:endParaRPr lang="en-US" dirty="0"/>
           </a:p>
@@ -2672,7 +2677,7 @@
           <a:p>
             <a:fld id="{029B1796-BCEB-C946-AF44-9F42A113BFC7}" type="datetime1">
               <a:rPr lang="en-CA" smtClean="0"/>
-              <a:t>2020-03-21</a:t>
+              <a:t>2020-03-22</a:t>
             </a:fld>
             <a:endParaRPr lang="en-US" dirty="0"/>
           </a:p>
@@ -3112,7 +3117,7 @@
           <a:p>
             <a:fld id="{9D740E58-6723-B744-ADF3-C1092D65F829}" type="datetime1">
               <a:rPr lang="en-CA" smtClean="0"/>
-              <a:t>2020-03-21</a:t>
+              <a:t>2020-03-22</a:t>
             </a:fld>
             <a:endParaRPr lang="en-US" dirty="0"/>
           </a:p>
@@ -3434,7 +3439,7 @@
           <a:p>
             <a:fld id="{B1A3551A-757D-4D41-8658-53B3027D66A3}" type="datetime1">
               <a:rPr lang="en-CA" smtClean="0"/>
-              <a:t>2020-03-21</a:t>
+              <a:t>2020-03-22</a:t>
             </a:fld>
             <a:endParaRPr lang="en-US" dirty="0"/>
           </a:p>
@@ -4349,7 +4354,9 @@
         </p:nvSpPr>
         <p:spPr/>
         <p:txBody>
-          <a:bodyPr/>
+          <a:bodyPr>
+            <a:normAutofit fontScale="92500" lnSpcReduction="20000"/>
+          </a:bodyPr>
           <a:lstStyle/>
           <a:p>
             <a:pPr marL="0" indent="0">
@@ -4357,13 +4364,47 @@
             </a:pPr>
             <a:r>
               <a:rPr lang="en-US" dirty="0"/>
-              <a:t>Based </a:t>
-            </a:r>
-            <a:r>
-              <a:rPr lang="en-US"/>
-              <a:t>on test datasets, </a:t>
-            </a:r>
-            <a:endParaRPr lang="en-US" dirty="0"/>
+              <a:t>I used Binomial Logistic Regression to perform binomial classification.</a:t>
+            </a:r>
+          </a:p>
+          <a:p>
+            <a:pPr marL="0" indent="0">
+              <a:buNone/>
+            </a:pPr>
+            <a:r>
+              <a:rPr lang="en-US" dirty="0"/>
+              <a:t>The main objective is to identify which feature(s) play important role in identifying weather a hotel booking will be cancelled or not. </a:t>
+            </a:r>
+          </a:p>
+          <a:p>
+            <a:pPr marL="0" indent="0">
+              <a:buNone/>
+            </a:pPr>
+            <a:endParaRPr lang="en-US" dirty="0"/>
+          </a:p>
+          <a:p>
+            <a:pPr marL="0" indent="0">
+              <a:buNone/>
+            </a:pPr>
+            <a:r>
+              <a:rPr lang="en-US" dirty="0"/>
+              <a:t>Based on 31 different features, there are several features that have significance on the final decision. For instance, people that has children and babies has tendencies to cancel their booking compared to those who doesn’t.</a:t>
+            </a:r>
+          </a:p>
+          <a:p>
+            <a:pPr marL="0" indent="0">
+              <a:buNone/>
+            </a:pPr>
+            <a:endParaRPr lang="en-US" dirty="0"/>
+          </a:p>
+          <a:p>
+            <a:pPr marL="0" indent="0">
+              <a:buNone/>
+            </a:pPr>
+            <a:r>
+              <a:rPr lang="en-US" dirty="0"/>
+              <a:t>For more detail, please look at the code and its output.</a:t>
+            </a:r>
           </a:p>
         </p:txBody>
       </p:sp>

</xml_diff>